<commit_message>
Update Statistical versus Descriptive Wording.pptx
</commit_message>
<xml_diff>
--- a/15 Heatmaps & Animations/class29_alt/Statistical versus Descriptive Wording.pptx
+++ b/15 Heatmaps & Animations/class29_alt/Statistical versus Descriptive Wording.pptx
@@ -107,6 +107,11 @@
       </a:defRPr>
     </a:lvl9pPr>
   </p:defaultTextStyle>
+  <p:extLst>
+    <p:ext uri="{EFAFB233-063F-42B5-8137-9DF3F51BA10A}">
+      <p15:sldGuideLst xmlns:p15="http://schemas.microsoft.com/office/powerpoint/2012/main"/>
+    </p:ext>
+  </p:extLst>
 </p:presentation>
 </file>
 
@@ -257,7 +262,7 @@
           <a:p>
             <a:fld id="{F45FA690-2258-4E0B-B57B-F20D840F17DC}" type="datetimeFigureOut">
               <a:rPr lang="en-US" smtClean="0"/>
-              <a:t>11/28/2022</a:t>
+              <a:t>11/29/2022</a:t>
             </a:fld>
             <a:endParaRPr lang="en-US"/>
           </a:p>
@@ -455,7 +460,7 @@
           <a:p>
             <a:fld id="{F45FA690-2258-4E0B-B57B-F20D840F17DC}" type="datetimeFigureOut">
               <a:rPr lang="en-US" smtClean="0"/>
-              <a:t>11/28/2022</a:t>
+              <a:t>11/29/2022</a:t>
             </a:fld>
             <a:endParaRPr lang="en-US"/>
           </a:p>
@@ -663,7 +668,7 @@
           <a:p>
             <a:fld id="{F45FA690-2258-4E0B-B57B-F20D840F17DC}" type="datetimeFigureOut">
               <a:rPr lang="en-US" smtClean="0"/>
-              <a:t>11/28/2022</a:t>
+              <a:t>11/29/2022</a:t>
             </a:fld>
             <a:endParaRPr lang="en-US"/>
           </a:p>
@@ -861,7 +866,7 @@
           <a:p>
             <a:fld id="{F45FA690-2258-4E0B-B57B-F20D840F17DC}" type="datetimeFigureOut">
               <a:rPr lang="en-US" smtClean="0"/>
-              <a:t>11/28/2022</a:t>
+              <a:t>11/29/2022</a:t>
             </a:fld>
             <a:endParaRPr lang="en-US"/>
           </a:p>
@@ -1136,7 +1141,7 @@
           <a:p>
             <a:fld id="{F45FA690-2258-4E0B-B57B-F20D840F17DC}" type="datetimeFigureOut">
               <a:rPr lang="en-US" smtClean="0"/>
-              <a:t>11/28/2022</a:t>
+              <a:t>11/29/2022</a:t>
             </a:fld>
             <a:endParaRPr lang="en-US"/>
           </a:p>
@@ -1401,7 +1406,7 @@
           <a:p>
             <a:fld id="{F45FA690-2258-4E0B-B57B-F20D840F17DC}" type="datetimeFigureOut">
               <a:rPr lang="en-US" smtClean="0"/>
-              <a:t>11/28/2022</a:t>
+              <a:t>11/29/2022</a:t>
             </a:fld>
             <a:endParaRPr lang="en-US"/>
           </a:p>
@@ -1813,7 +1818,7 @@
           <a:p>
             <a:fld id="{F45FA690-2258-4E0B-B57B-F20D840F17DC}" type="datetimeFigureOut">
               <a:rPr lang="en-US" smtClean="0"/>
-              <a:t>11/28/2022</a:t>
+              <a:t>11/29/2022</a:t>
             </a:fld>
             <a:endParaRPr lang="en-US"/>
           </a:p>
@@ -1954,7 +1959,7 @@
           <a:p>
             <a:fld id="{F45FA690-2258-4E0B-B57B-F20D840F17DC}" type="datetimeFigureOut">
               <a:rPr lang="en-US" smtClean="0"/>
-              <a:t>11/28/2022</a:t>
+              <a:t>11/29/2022</a:t>
             </a:fld>
             <a:endParaRPr lang="en-US"/>
           </a:p>
@@ -2067,7 +2072,7 @@
           <a:p>
             <a:fld id="{F45FA690-2258-4E0B-B57B-F20D840F17DC}" type="datetimeFigureOut">
               <a:rPr lang="en-US" smtClean="0"/>
-              <a:t>11/28/2022</a:t>
+              <a:t>11/29/2022</a:t>
             </a:fld>
             <a:endParaRPr lang="en-US"/>
           </a:p>
@@ -2378,7 +2383,7 @@
           <a:p>
             <a:fld id="{F45FA690-2258-4E0B-B57B-F20D840F17DC}" type="datetimeFigureOut">
               <a:rPr lang="en-US" smtClean="0"/>
-              <a:t>11/28/2022</a:t>
+              <a:t>11/29/2022</a:t>
             </a:fld>
             <a:endParaRPr lang="en-US"/>
           </a:p>
@@ -2666,7 +2671,7 @@
           <a:p>
             <a:fld id="{F45FA690-2258-4E0B-B57B-F20D840F17DC}" type="datetimeFigureOut">
               <a:rPr lang="en-US" smtClean="0"/>
-              <a:t>11/28/2022</a:t>
+              <a:t>11/29/2022</a:t>
             </a:fld>
             <a:endParaRPr lang="en-US"/>
           </a:p>
@@ -2907,7 +2912,7 @@
           <a:p>
             <a:fld id="{F45FA690-2258-4E0B-B57B-F20D840F17DC}" type="datetimeFigureOut">
               <a:rPr lang="en-US" smtClean="0"/>
-              <a:t>11/28/2022</a:t>
+              <a:t>11/29/2022</a:t>
             </a:fld>
             <a:endParaRPr lang="en-US"/>
           </a:p>
@@ -3755,12 +3760,16 @@
           </a:p>
           <a:p>
             <a:r>
-              <a:rPr lang="en-US" b="1" dirty="0"/>
-              <a:t>Statistical Insignificant</a:t>
+              <a:rPr lang="en-US" b="1"/>
+              <a:t>Statistical Insignificance</a:t>
+            </a:r>
+            <a:r>
+              <a:rPr lang="en-US"/>
+              <a:t>: </a:t>
             </a:r>
             <a:r>
               <a:rPr lang="en-US" dirty="0"/>
-              <a:t>: we cannot conclude that there was a change.</a:t>
+              <a:t>we cannot conclude that there was a change.</a:t>
             </a:r>
           </a:p>
           <a:p>

</xml_diff>